<commit_message>
day 3 of pmgmt
</commit_message>
<xml_diff>
--- a/pmgmt/Pow010.Introduction.pptx
+++ b/pmgmt/Pow010.Introduction.pptx
@@ -243,7 +243,7 @@
             <a:fld id="{91AA33BB-5012-4FA9-BC94-2423B0F96BF0}" type="datetimeFigureOut">
               <a:rPr lang="en-US" smtClean="0"/>
               <a:pPr/>
-              <a:t>8/26/2013</a:t>
+              <a:t>8/29/2013</a:t>
             </a:fld>
             <a:endParaRPr lang="en-US"/>
           </a:p>
@@ -6079,10 +6079,10 @@
               <a:t>August 2013, Intel </a:t>
             </a:r>
             <a:r>
-              <a:rPr lang="en-US" smtClean="0"/>
-              <a:t>Banglor</a:t>
-            </a:r>
-            <a:endParaRPr lang="he-IL"/>
+              <a:rPr lang="en-US" dirty="0" smtClean="0"/>
+              <a:t>Bangalore</a:t>
+            </a:r>
+            <a:endParaRPr lang="he-IL" dirty="0"/>
           </a:p>
         </p:txBody>
       </p:sp>
@@ -6508,47 +6508,49 @@
           <a:p>
             <a:pPr lvl="1"/>
             <a:r>
+              <a:rPr lang="en-US" dirty="0" smtClean="0"/>
+              <a:t>http://</a:t>
+            </a:r>
+            <a:r>
+              <a:rPr lang="en-US" dirty="0" smtClean="0"/>
+              <a:t>sela.co.il</a:t>
+            </a:r>
+          </a:p>
+          <a:p>
+            <a:pPr lvl="1"/>
+            <a:r>
+              <a:rPr lang="en-US" dirty="0" smtClean="0"/>
+              <a:t>http</a:t>
+            </a:r>
+            <a:r>
+              <a:rPr lang="en-US" smtClean="0"/>
+              <a:t>://london.org.il</a:t>
+            </a:r>
+            <a:endParaRPr lang="en-US" dirty="0" smtClean="0"/>
+          </a:p>
+          <a:p>
+            <a:r>
+              <a:rPr lang="en-US" dirty="0" smtClean="0"/>
+              <a:t>Material for the course:</a:t>
+            </a:r>
+          </a:p>
+          <a:p>
+            <a:pPr lvl="1"/>
+            <a:r>
               <a:rPr lang="en-US" dirty="0" smtClean="0">
                 <a:hlinkClick r:id="rId3"/>
               </a:rPr>
-              <a:t>http://sela.co.il</a:t>
-            </a:r>
-          </a:p>
-          <a:p>
-            <a:pPr lvl="1"/>
+              <a:t>http://</a:t>
+            </a:r>
             <a:r>
               <a:rPr lang="en-US" dirty="0" smtClean="0">
                 <a:hlinkClick r:id="rId3"/>
               </a:rPr>
-              <a:t>http://london.org.il</a:t>
-            </a:r>
-            <a:endParaRPr lang="en-US" dirty="0"/>
-          </a:p>
-          <a:p>
-            <a:pPr lvl="1"/>
-            <a:r>
-              <a:rPr lang="en-US" dirty="0" smtClean="0"/>
-              <a:t>Skype: </a:t>
-            </a:r>
-            <a:r>
-              <a:rPr lang="en-US" dirty="0" err="1" smtClean="0"/>
-              <a:t>uri-london</a:t>
-            </a:r>
-            <a:endParaRPr lang="en-US" dirty="0" smtClean="0"/>
-          </a:p>
-          <a:p>
-            <a:r>
-              <a:rPr lang="en-US" dirty="0" smtClean="0"/>
-              <a:t>Material for the course:</a:t>
-            </a:r>
-          </a:p>
-          <a:p>
-            <a:pPr lvl="1"/>
-            <a:r>
-              <a:rPr lang="en-US" dirty="0" smtClean="0">
-                <a:hlinkClick r:id="rId4"/>
-              </a:rPr>
-              <a:t>http://projects.london.org.il/pmgmt</a:t>
+              <a:t>projects.london.org.il/pmgmt/index.html</a:t>
+            </a:r>
+            <a:r>
+              <a:rPr lang="en-US" dirty="0" smtClean="0"/>
+              <a:t>	</a:t>
             </a:r>
             <a:endParaRPr lang="en-US" dirty="0" smtClean="0"/>
           </a:p>
@@ -6630,6 +6632,13 @@
   <p:clrMapOvr>
     <a:masterClrMapping/>
   </p:clrMapOvr>
+  <p:timing>
+    <p:tnLst>
+      <p:par>
+        <p:cTn id="1" dur="indefinite" restart="never" nodeType="tmRoot"/>
+      </p:par>
+    </p:tnLst>
+  </p:timing>
 </p:sld>
 </file>
 
@@ -6831,6 +6840,13 @@
   <p:clrMapOvr>
     <a:masterClrMapping/>
   </p:clrMapOvr>
+  <p:timing>
+    <p:tnLst>
+      <p:par>
+        <p:cTn id="1" dur="indefinite" restart="never" nodeType="tmRoot"/>
+      </p:par>
+    </p:tnLst>
+  </p:timing>
 </p:sld>
 </file>
 

</xml_diff>